<commit_message>
Included steps for QAP procedure; created skeletal code with igraph conflict example
</commit_message>
<xml_diff>
--- a/R/Advanced Network Analysis Using R/Advanced Network Analysis using R.pptx
+++ b/R/Advanced Network Analysis Using R/Advanced Network Analysis using R.pptx
@@ -4,6 +4,9 @@
   <p:sldMasterIdLst>
     <p:sldMasterId id="2147483648" r:id="rId1"/>
   </p:sldMasterIdLst>
+  <p:notesMasterIdLst>
+    <p:notesMasterId r:id="rId10"/>
+  </p:notesMasterIdLst>
   <p:sldIdLst>
     <p:sldId id="256" r:id="rId2"/>
     <p:sldId id="257" r:id="rId3"/>
@@ -13,7 +16,6 @@
     <p:sldId id="271" r:id="rId7"/>
     <p:sldId id="267" r:id="rId8"/>
     <p:sldId id="268" r:id="rId9"/>
-    <p:sldId id="269" r:id="rId10"/>
   </p:sldIdLst>
   <p:sldSz cx="12192000" cy="6858000"/>
   <p:notesSz cx="6858000" cy="9144000"/>
@@ -123,6 +125,440 @@
 </p:presentation>
 </file>
 
+<file path=ppt/notesMasters/notesMaster1.xml><?xml version="1.0" encoding="utf-8"?>
+<p:notesMaster xmlns:a="http://schemas.openxmlformats.org/drawingml/2006/main" xmlns:r="http://schemas.openxmlformats.org/officeDocument/2006/relationships" xmlns:p="http://schemas.openxmlformats.org/presentationml/2006/main">
+  <p:cSld>
+    <p:bg>
+      <p:bgRef idx="1001">
+        <a:schemeClr val="bg1"/>
+      </p:bgRef>
+    </p:bg>
+    <p:spTree>
+      <p:nvGrpSpPr>
+        <p:cNvPr id="1" name=""/>
+        <p:cNvGrpSpPr/>
+        <p:nvPr/>
+      </p:nvGrpSpPr>
+      <p:grpSpPr>
+        <a:xfrm>
+          <a:off x="0" y="0"/>
+          <a:ext cx="0" cy="0"/>
+          <a:chOff x="0" y="0"/>
+          <a:chExt cx="0" cy="0"/>
+        </a:xfrm>
+      </p:grpSpPr>
+      <p:sp>
+        <p:nvSpPr>
+          <p:cNvPr id="2" name="Header Placeholder 1"/>
+          <p:cNvSpPr>
+            <a:spLocks noGrp="1"/>
+          </p:cNvSpPr>
+          <p:nvPr>
+            <p:ph type="hdr" sz="quarter"/>
+          </p:nvPr>
+        </p:nvSpPr>
+        <p:spPr>
+          <a:xfrm>
+            <a:off x="0" y="0"/>
+            <a:ext cx="2971800" cy="458788"/>
+          </a:xfrm>
+          <a:prstGeom prst="rect">
+            <a:avLst/>
+          </a:prstGeom>
+        </p:spPr>
+        <p:txBody>
+          <a:bodyPr vert="horz" lIns="91440" tIns="45720" rIns="91440" bIns="45720" rtlCol="0"/>
+          <a:lstStyle>
+            <a:lvl1pPr algn="l">
+              <a:defRPr sz="1200"/>
+            </a:lvl1pPr>
+          </a:lstStyle>
+          <a:p>
+            <a:endParaRPr lang="en-US"/>
+          </a:p>
+        </p:txBody>
+      </p:sp>
+      <p:sp>
+        <p:nvSpPr>
+          <p:cNvPr id="3" name="Date Placeholder 2"/>
+          <p:cNvSpPr>
+            <a:spLocks noGrp="1"/>
+          </p:cNvSpPr>
+          <p:nvPr>
+            <p:ph type="dt" idx="1"/>
+          </p:nvPr>
+        </p:nvSpPr>
+        <p:spPr>
+          <a:xfrm>
+            <a:off x="3884613" y="0"/>
+            <a:ext cx="2971800" cy="458788"/>
+          </a:xfrm>
+          <a:prstGeom prst="rect">
+            <a:avLst/>
+          </a:prstGeom>
+        </p:spPr>
+        <p:txBody>
+          <a:bodyPr vert="horz" lIns="91440" tIns="45720" rIns="91440" bIns="45720" rtlCol="0"/>
+          <a:lstStyle>
+            <a:lvl1pPr algn="r">
+              <a:defRPr sz="1200"/>
+            </a:lvl1pPr>
+          </a:lstStyle>
+          <a:p>
+            <a:fld id="{D4A9E7A6-09C0-4544-AE42-76C56CBEEAB5}" type="datetimeFigureOut">
+              <a:rPr lang="en-US" smtClean="0"/>
+              <a:t>4/30/2019</a:t>
+            </a:fld>
+            <a:endParaRPr lang="en-US"/>
+          </a:p>
+        </p:txBody>
+      </p:sp>
+      <p:sp>
+        <p:nvSpPr>
+          <p:cNvPr id="4" name="Slide Image Placeholder 3"/>
+          <p:cNvSpPr>
+            <a:spLocks noGrp="1" noRot="1" noChangeAspect="1"/>
+          </p:cNvSpPr>
+          <p:nvPr>
+            <p:ph type="sldImg" idx="2"/>
+          </p:nvPr>
+        </p:nvSpPr>
+        <p:spPr>
+          <a:xfrm>
+            <a:off x="685800" y="1143000"/>
+            <a:ext cx="5486400" cy="3086100"/>
+          </a:xfrm>
+          <a:prstGeom prst="rect">
+            <a:avLst/>
+          </a:prstGeom>
+          <a:noFill/>
+          <a:ln w="12700">
+            <a:solidFill>
+              <a:prstClr val="black"/>
+            </a:solidFill>
+          </a:ln>
+        </p:spPr>
+        <p:txBody>
+          <a:bodyPr vert="horz" lIns="91440" tIns="45720" rIns="91440" bIns="45720" rtlCol="0" anchor="ctr"/>
+          <a:lstStyle/>
+          <a:p>
+            <a:endParaRPr lang="en-US"/>
+          </a:p>
+        </p:txBody>
+      </p:sp>
+      <p:sp>
+        <p:nvSpPr>
+          <p:cNvPr id="5" name="Notes Placeholder 4"/>
+          <p:cNvSpPr>
+            <a:spLocks noGrp="1"/>
+          </p:cNvSpPr>
+          <p:nvPr>
+            <p:ph type="body" sz="quarter" idx="3"/>
+          </p:nvPr>
+        </p:nvSpPr>
+        <p:spPr>
+          <a:xfrm>
+            <a:off x="685800" y="4400550"/>
+            <a:ext cx="5486400" cy="3600450"/>
+          </a:xfrm>
+          <a:prstGeom prst="rect">
+            <a:avLst/>
+          </a:prstGeom>
+        </p:spPr>
+        <p:txBody>
+          <a:bodyPr vert="horz" lIns="91440" tIns="45720" rIns="91440" bIns="45720" rtlCol="0"/>
+          <a:lstStyle/>
+          <a:p>
+            <a:pPr lvl="0"/>
+            <a:r>
+              <a:rPr lang="en-US" smtClean="0"/>
+              <a:t>Edit Master text styles</a:t>
+            </a:r>
+          </a:p>
+          <a:p>
+            <a:pPr lvl="1"/>
+            <a:r>
+              <a:rPr lang="en-US" smtClean="0"/>
+              <a:t>Second level</a:t>
+            </a:r>
+          </a:p>
+          <a:p>
+            <a:pPr lvl="2"/>
+            <a:r>
+              <a:rPr lang="en-US" smtClean="0"/>
+              <a:t>Third level</a:t>
+            </a:r>
+          </a:p>
+          <a:p>
+            <a:pPr lvl="3"/>
+            <a:r>
+              <a:rPr lang="en-US" smtClean="0"/>
+              <a:t>Fourth level</a:t>
+            </a:r>
+          </a:p>
+          <a:p>
+            <a:pPr lvl="4"/>
+            <a:r>
+              <a:rPr lang="en-US" smtClean="0"/>
+              <a:t>Fifth level</a:t>
+            </a:r>
+            <a:endParaRPr lang="en-US"/>
+          </a:p>
+        </p:txBody>
+      </p:sp>
+      <p:sp>
+        <p:nvSpPr>
+          <p:cNvPr id="6" name="Footer Placeholder 5"/>
+          <p:cNvSpPr>
+            <a:spLocks noGrp="1"/>
+          </p:cNvSpPr>
+          <p:nvPr>
+            <p:ph type="ftr" sz="quarter" idx="4"/>
+          </p:nvPr>
+        </p:nvSpPr>
+        <p:spPr>
+          <a:xfrm>
+            <a:off x="0" y="8685213"/>
+            <a:ext cx="2971800" cy="458787"/>
+          </a:xfrm>
+          <a:prstGeom prst="rect">
+            <a:avLst/>
+          </a:prstGeom>
+        </p:spPr>
+        <p:txBody>
+          <a:bodyPr vert="horz" lIns="91440" tIns="45720" rIns="91440" bIns="45720" rtlCol="0" anchor="b"/>
+          <a:lstStyle>
+            <a:lvl1pPr algn="l">
+              <a:defRPr sz="1200"/>
+            </a:lvl1pPr>
+          </a:lstStyle>
+          <a:p>
+            <a:endParaRPr lang="en-US"/>
+          </a:p>
+        </p:txBody>
+      </p:sp>
+      <p:sp>
+        <p:nvSpPr>
+          <p:cNvPr id="7" name="Slide Number Placeholder 6"/>
+          <p:cNvSpPr>
+            <a:spLocks noGrp="1"/>
+          </p:cNvSpPr>
+          <p:nvPr>
+            <p:ph type="sldNum" sz="quarter" idx="5"/>
+          </p:nvPr>
+        </p:nvSpPr>
+        <p:spPr>
+          <a:xfrm>
+            <a:off x="3884613" y="8685213"/>
+            <a:ext cx="2971800" cy="458787"/>
+          </a:xfrm>
+          <a:prstGeom prst="rect">
+            <a:avLst/>
+          </a:prstGeom>
+        </p:spPr>
+        <p:txBody>
+          <a:bodyPr vert="horz" lIns="91440" tIns="45720" rIns="91440" bIns="45720" rtlCol="0" anchor="b"/>
+          <a:lstStyle>
+            <a:lvl1pPr algn="r">
+              <a:defRPr sz="1200"/>
+            </a:lvl1pPr>
+          </a:lstStyle>
+          <a:p>
+            <a:fld id="{BFEA2D45-A966-43DF-B48D-89DD01F24D6C}" type="slidenum">
+              <a:rPr lang="en-US" smtClean="0"/>
+              <a:t>‹#›</a:t>
+            </a:fld>
+            <a:endParaRPr lang="en-US"/>
+          </a:p>
+        </p:txBody>
+      </p:sp>
+    </p:spTree>
+    <p:extLst>
+      <p:ext uri="{BB962C8B-B14F-4D97-AF65-F5344CB8AC3E}">
+        <p14:creationId xmlns:p14="http://schemas.microsoft.com/office/powerpoint/2010/main" val="2080440718"/>
+      </p:ext>
+    </p:extLst>
+  </p:cSld>
+  <p:clrMap bg1="lt1" tx1="dk1" bg2="lt2" tx2="dk2" accent1="accent1" accent2="accent2" accent3="accent3" accent4="accent4" accent5="accent5" accent6="accent6" hlink="hlink" folHlink="folHlink"/>
+  <p:notesStyle>
+    <a:lvl1pPr marL="0" algn="l" defTabSz="914400" rtl="0" eaLnBrk="1" latinLnBrk="0" hangingPunct="1">
+      <a:defRPr sz="1200" kern="1200">
+        <a:solidFill>
+          <a:schemeClr val="tx1"/>
+        </a:solidFill>
+        <a:latin typeface="+mn-lt"/>
+        <a:ea typeface="+mn-ea"/>
+        <a:cs typeface="+mn-cs"/>
+      </a:defRPr>
+    </a:lvl1pPr>
+    <a:lvl2pPr marL="457200" algn="l" defTabSz="914400" rtl="0" eaLnBrk="1" latinLnBrk="0" hangingPunct="1">
+      <a:defRPr sz="1200" kern="1200">
+        <a:solidFill>
+          <a:schemeClr val="tx1"/>
+        </a:solidFill>
+        <a:latin typeface="+mn-lt"/>
+        <a:ea typeface="+mn-ea"/>
+        <a:cs typeface="+mn-cs"/>
+      </a:defRPr>
+    </a:lvl2pPr>
+    <a:lvl3pPr marL="914400" algn="l" defTabSz="914400" rtl="0" eaLnBrk="1" latinLnBrk="0" hangingPunct="1">
+      <a:defRPr sz="1200" kern="1200">
+        <a:solidFill>
+          <a:schemeClr val="tx1"/>
+        </a:solidFill>
+        <a:latin typeface="+mn-lt"/>
+        <a:ea typeface="+mn-ea"/>
+        <a:cs typeface="+mn-cs"/>
+      </a:defRPr>
+    </a:lvl3pPr>
+    <a:lvl4pPr marL="1371600" algn="l" defTabSz="914400" rtl="0" eaLnBrk="1" latinLnBrk="0" hangingPunct="1">
+      <a:defRPr sz="1200" kern="1200">
+        <a:solidFill>
+          <a:schemeClr val="tx1"/>
+        </a:solidFill>
+        <a:latin typeface="+mn-lt"/>
+        <a:ea typeface="+mn-ea"/>
+        <a:cs typeface="+mn-cs"/>
+      </a:defRPr>
+    </a:lvl4pPr>
+    <a:lvl5pPr marL="1828800" algn="l" defTabSz="914400" rtl="0" eaLnBrk="1" latinLnBrk="0" hangingPunct="1">
+      <a:defRPr sz="1200" kern="1200">
+        <a:solidFill>
+          <a:schemeClr val="tx1"/>
+        </a:solidFill>
+        <a:latin typeface="+mn-lt"/>
+        <a:ea typeface="+mn-ea"/>
+        <a:cs typeface="+mn-cs"/>
+      </a:defRPr>
+    </a:lvl5pPr>
+    <a:lvl6pPr marL="2286000" algn="l" defTabSz="914400" rtl="0" eaLnBrk="1" latinLnBrk="0" hangingPunct="1">
+      <a:defRPr sz="1200" kern="1200">
+        <a:solidFill>
+          <a:schemeClr val="tx1"/>
+        </a:solidFill>
+        <a:latin typeface="+mn-lt"/>
+        <a:ea typeface="+mn-ea"/>
+        <a:cs typeface="+mn-cs"/>
+      </a:defRPr>
+    </a:lvl6pPr>
+    <a:lvl7pPr marL="2743200" algn="l" defTabSz="914400" rtl="0" eaLnBrk="1" latinLnBrk="0" hangingPunct="1">
+      <a:defRPr sz="1200" kern="1200">
+        <a:solidFill>
+          <a:schemeClr val="tx1"/>
+        </a:solidFill>
+        <a:latin typeface="+mn-lt"/>
+        <a:ea typeface="+mn-ea"/>
+        <a:cs typeface="+mn-cs"/>
+      </a:defRPr>
+    </a:lvl7pPr>
+    <a:lvl8pPr marL="3200400" algn="l" defTabSz="914400" rtl="0" eaLnBrk="1" latinLnBrk="0" hangingPunct="1">
+      <a:defRPr sz="1200" kern="1200">
+        <a:solidFill>
+          <a:schemeClr val="tx1"/>
+        </a:solidFill>
+        <a:latin typeface="+mn-lt"/>
+        <a:ea typeface="+mn-ea"/>
+        <a:cs typeface="+mn-cs"/>
+      </a:defRPr>
+    </a:lvl8pPr>
+    <a:lvl9pPr marL="3657600" algn="l" defTabSz="914400" rtl="0" eaLnBrk="1" latinLnBrk="0" hangingPunct="1">
+      <a:defRPr sz="1200" kern="1200">
+        <a:solidFill>
+          <a:schemeClr val="tx1"/>
+        </a:solidFill>
+        <a:latin typeface="+mn-lt"/>
+        <a:ea typeface="+mn-ea"/>
+        <a:cs typeface="+mn-cs"/>
+      </a:defRPr>
+    </a:lvl9pPr>
+  </p:notesStyle>
+</p:notesMaster>
+</file>
+
+<file path=ppt/notesSlides/notesSlide1.xml><?xml version="1.0" encoding="utf-8"?>
+<p:notes xmlns:a="http://schemas.openxmlformats.org/drawingml/2006/main" xmlns:r="http://schemas.openxmlformats.org/officeDocument/2006/relationships" xmlns:p="http://schemas.openxmlformats.org/presentationml/2006/main">
+  <p:cSld>
+    <p:spTree>
+      <p:nvGrpSpPr>
+        <p:cNvPr id="1" name=""/>
+        <p:cNvGrpSpPr/>
+        <p:nvPr/>
+      </p:nvGrpSpPr>
+      <p:grpSpPr>
+        <a:xfrm>
+          <a:off x="0" y="0"/>
+          <a:ext cx="0" cy="0"/>
+          <a:chOff x="0" y="0"/>
+          <a:chExt cx="0" cy="0"/>
+        </a:xfrm>
+      </p:grpSpPr>
+      <p:sp>
+        <p:nvSpPr>
+          <p:cNvPr id="2" name="Slide Image Placeholder 1"/>
+          <p:cNvSpPr>
+            <a:spLocks noGrp="1" noRot="1" noChangeAspect="1"/>
+          </p:cNvSpPr>
+          <p:nvPr>
+            <p:ph type="sldImg"/>
+          </p:nvPr>
+        </p:nvSpPr>
+        <p:spPr/>
+      </p:sp>
+      <p:sp>
+        <p:nvSpPr>
+          <p:cNvPr id="3" name="Notes Placeholder 2"/>
+          <p:cNvSpPr>
+            <a:spLocks noGrp="1"/>
+          </p:cNvSpPr>
+          <p:nvPr>
+            <p:ph type="body" idx="1"/>
+          </p:nvPr>
+        </p:nvSpPr>
+        <p:spPr/>
+        <p:txBody>
+          <a:bodyPr/>
+          <a:lstStyle/>
+          <a:p>
+            <a:endParaRPr lang="en-US" dirty="0"/>
+          </a:p>
+        </p:txBody>
+      </p:sp>
+      <p:sp>
+        <p:nvSpPr>
+          <p:cNvPr id="4" name="Slide Number Placeholder 3"/>
+          <p:cNvSpPr>
+            <a:spLocks noGrp="1"/>
+          </p:cNvSpPr>
+          <p:nvPr>
+            <p:ph type="sldNum" sz="quarter" idx="10"/>
+          </p:nvPr>
+        </p:nvSpPr>
+        <p:spPr/>
+        <p:txBody>
+          <a:bodyPr/>
+          <a:lstStyle/>
+          <a:p>
+            <a:fld id="{BFEA2D45-A966-43DF-B48D-89DD01F24D6C}" type="slidenum">
+              <a:rPr lang="en-US" smtClean="0"/>
+              <a:t>5</a:t>
+            </a:fld>
+            <a:endParaRPr lang="en-US"/>
+          </a:p>
+        </p:txBody>
+      </p:sp>
+    </p:spTree>
+    <p:extLst>
+      <p:ext uri="{BB962C8B-B14F-4D97-AF65-F5344CB8AC3E}">
+        <p14:creationId xmlns:p14="http://schemas.microsoft.com/office/powerpoint/2010/main" val="1449552321"/>
+      </p:ext>
+    </p:extLst>
+  </p:cSld>
+  <p:clrMapOvr>
+    <a:masterClrMapping/>
+  </p:clrMapOvr>
+</p:notes>
+</file>
+
 <file path=ppt/slideLayouts/slideLayout1.xml><?xml version="1.0" encoding="utf-8"?>
 <p:sldLayout xmlns:a="http://schemas.openxmlformats.org/drawingml/2006/main" xmlns:r="http://schemas.openxmlformats.org/officeDocument/2006/relationships" xmlns:p="http://schemas.openxmlformats.org/presentationml/2006/main" type="title" preserve="1">
   <p:cSld name="Title Slide">
@@ -309,7 +745,7 @@
           <a:p>
             <a:fld id="{4AAD347D-5ACD-4C99-B74B-A9C85AD731AF}" type="datetimeFigureOut">
               <a:rPr lang="en-US" dirty="0"/>
-              <a:t>4/25/2019</a:t>
+              <a:t>4/30/2019</a:t>
             </a:fld>
             <a:endParaRPr lang="en-US" dirty="0"/>
           </a:p>
@@ -579,7 +1015,7 @@
           <a:p>
             <a:fld id="{4509A250-FF31-4206-8172-F9D3106AACB1}" type="datetimeFigureOut">
               <a:rPr lang="en-US" dirty="0"/>
-              <a:t>4/25/2019</a:t>
+              <a:t>4/30/2019</a:t>
             </a:fld>
             <a:endParaRPr lang="en-US" dirty="0"/>
           </a:p>
@@ -768,7 +1204,7 @@
           <a:p>
             <a:fld id="{4509A250-FF31-4206-8172-F9D3106AACB1}" type="datetimeFigureOut">
               <a:rPr lang="en-US" dirty="0"/>
-              <a:t>4/25/2019</a:t>
+              <a:t>4/30/2019</a:t>
             </a:fld>
             <a:endParaRPr lang="en-US" dirty="0"/>
           </a:p>
@@ -1036,7 +1472,7 @@
           <a:p>
             <a:fld id="{4509A250-FF31-4206-8172-F9D3106AACB1}" type="datetimeFigureOut">
               <a:rPr lang="en-US" dirty="0"/>
-              <a:t>4/25/2019</a:t>
+              <a:t>4/30/2019</a:t>
             </a:fld>
             <a:endParaRPr lang="en-US" dirty="0"/>
           </a:p>
@@ -1372,7 +1808,7 @@
           <a:p>
             <a:fld id="{4509A250-FF31-4206-8172-F9D3106AACB1}" type="datetimeFigureOut">
               <a:rPr lang="en-US" dirty="0"/>
-              <a:t>4/25/2019</a:t>
+              <a:t>4/30/2019</a:t>
             </a:fld>
             <a:endParaRPr lang="en-US" dirty="0"/>
           </a:p>
@@ -1990,7 +2426,7 @@
           <a:p>
             <a:fld id="{4509A250-FF31-4206-8172-F9D3106AACB1}" type="datetimeFigureOut">
               <a:rPr lang="en-US" dirty="0"/>
-              <a:t>4/25/2019</a:t>
+              <a:t>4/30/2019</a:t>
             </a:fld>
             <a:endParaRPr lang="en-US" dirty="0"/>
           </a:p>
@@ -2845,7 +3281,7 @@
           <a:p>
             <a:fld id="{4509A250-FF31-4206-8172-F9D3106AACB1}" type="datetimeFigureOut">
               <a:rPr lang="en-US" dirty="0"/>
-              <a:t>4/25/2019</a:t>
+              <a:t>4/30/2019</a:t>
             </a:fld>
             <a:endParaRPr lang="en-US" dirty="0"/>
           </a:p>
@@ -3010,7 +3446,7 @@
           <a:p>
             <a:fld id="{4509A250-FF31-4206-8172-F9D3106AACB1}" type="datetimeFigureOut">
               <a:rPr lang="en-US" dirty="0"/>
-              <a:t>4/25/2019</a:t>
+              <a:t>4/30/2019</a:t>
             </a:fld>
             <a:endParaRPr lang="en-US" dirty="0"/>
           </a:p>
@@ -3185,7 +3621,7 @@
           <a:p>
             <a:fld id="{4509A250-FF31-4206-8172-F9D3106AACB1}" type="datetimeFigureOut">
               <a:rPr lang="en-US" dirty="0"/>
-              <a:t>4/25/2019</a:t>
+              <a:t>4/30/2019</a:t>
             </a:fld>
             <a:endParaRPr lang="en-US" dirty="0"/>
           </a:p>
@@ -3350,7 +3786,7 @@
           <a:p>
             <a:fld id="{4509A250-FF31-4206-8172-F9D3106AACB1}" type="datetimeFigureOut">
               <a:rPr lang="en-US" dirty="0"/>
-              <a:t>4/25/2019</a:t>
+              <a:t>4/30/2019</a:t>
             </a:fld>
             <a:endParaRPr lang="en-US" dirty="0"/>
           </a:p>
@@ -3592,7 +4028,7 @@
           <a:p>
             <a:fld id="{9796027F-7875-4030-9381-8BD8C4F21935}" type="datetimeFigureOut">
               <a:rPr lang="en-US" dirty="0"/>
-              <a:t>4/25/2019</a:t>
+              <a:t>4/30/2019</a:t>
             </a:fld>
             <a:endParaRPr lang="en-US" dirty="0"/>
           </a:p>
@@ -3879,7 +4315,7 @@
           <a:p>
             <a:fld id="{9796027F-7875-4030-9381-8BD8C4F21935}" type="datetimeFigureOut">
               <a:rPr lang="en-US" dirty="0"/>
-              <a:t>4/25/2019</a:t>
+              <a:t>4/30/2019</a:t>
             </a:fld>
             <a:endParaRPr lang="en-US" dirty="0"/>
           </a:p>
@@ -4318,7 +4754,7 @@
           <a:p>
             <a:fld id="{9796027F-7875-4030-9381-8BD8C4F21935}" type="datetimeFigureOut">
               <a:rPr lang="en-US" dirty="0"/>
-              <a:t>4/25/2019</a:t>
+              <a:t>4/30/2019</a:t>
             </a:fld>
             <a:endParaRPr lang="en-US" dirty="0"/>
           </a:p>
@@ -4431,7 +4867,7 @@
           <a:p>
             <a:fld id="{4509A250-FF31-4206-8172-F9D3106AACB1}" type="datetimeFigureOut">
               <a:rPr lang="en-US" dirty="0"/>
-              <a:t>4/25/2019</a:t>
+              <a:t>4/30/2019</a:t>
             </a:fld>
             <a:endParaRPr lang="en-US" dirty="0"/>
           </a:p>
@@ -4521,7 +4957,7 @@
           <a:p>
             <a:fld id="{4509A250-FF31-4206-8172-F9D3106AACB1}" type="datetimeFigureOut">
               <a:rPr lang="en-US" dirty="0"/>
-              <a:t>4/25/2019</a:t>
+              <a:t>4/30/2019</a:t>
             </a:fld>
             <a:endParaRPr lang="en-US" dirty="0"/>
           </a:p>
@@ -4795,7 +5231,7 @@
           <a:p>
             <a:fld id="{4509A250-FF31-4206-8172-F9D3106AACB1}" type="datetimeFigureOut">
               <a:rPr lang="en-US" dirty="0"/>
-              <a:t>4/25/2019</a:t>
+              <a:t>4/30/2019</a:t>
             </a:fld>
             <a:endParaRPr lang="en-US" dirty="0"/>
           </a:p>
@@ -5065,7 +5501,7 @@
           <a:p>
             <a:fld id="{4509A250-FF31-4206-8172-F9D3106AACB1}" type="datetimeFigureOut">
               <a:rPr lang="en-US" dirty="0"/>
-              <a:t>4/25/2019</a:t>
+              <a:t>4/30/2019</a:t>
             </a:fld>
             <a:endParaRPr lang="en-US" dirty="0"/>
           </a:p>
@@ -5489,7 +5925,7 @@
           <a:p>
             <a:fld id="{4AAD347D-5ACD-4C99-B74B-A9C85AD731AF}" type="datetimeFigureOut">
               <a:rPr lang="en-US" dirty="0"/>
-              <a:t>4/25/2019</a:t>
+              <a:t>4/30/2019</a:t>
             </a:fld>
             <a:endParaRPr lang="en-US" dirty="0"/>
           </a:p>
@@ -6377,12 +6813,6 @@
             </a:r>
           </a:p>
           <a:p>
-            <a:r>
-              <a:rPr lang="en-US" sz="2800" dirty="0"/>
-              <a:t>Network Regression</a:t>
-            </a:r>
-          </a:p>
-          <a:p>
             <a:pPr marL="0" indent="0">
               <a:buNone/>
             </a:pPr>
@@ -6492,8 +6922,20 @@
             <a:pPr lvl="1"/>
             <a:r>
               <a:rPr lang="en-US" dirty="0"/>
-              <a:t>Are network ties weighted? Binary</a:t>
-            </a:r>
+              <a:t>Are network ties weighted? </a:t>
+            </a:r>
+            <a:r>
+              <a:rPr lang="en-US" dirty="0" smtClean="0"/>
+              <a:t>Binary</a:t>
+            </a:r>
+          </a:p>
+          <a:p>
+            <a:pPr lvl="1"/>
+            <a:r>
+              <a:rPr lang="en-US" dirty="0" smtClean="0"/>
+              <a:t>Are there isolates? What to do with them?</a:t>
+            </a:r>
+            <a:endParaRPr lang="en-US" dirty="0"/>
           </a:p>
           <a:p>
             <a:r>
@@ -6829,7 +7271,7 @@
           <a:p>
             <a:r>
               <a:rPr lang="en-US" dirty="0"/>
-              <a:t>QAP</a:t>
+              <a:t>QAP and Network Regression</a:t>
             </a:r>
           </a:p>
         </p:txBody>
@@ -6866,6 +7308,112 @@
               <a:rPr lang="en-US" dirty="0"/>
               <a:t>Are two networks or is a network and a matrix of covariates associated?</a:t>
             </a:r>
+          </a:p>
+          <a:p>
+            <a:pPr lvl="1"/>
+            <a:r>
+              <a:rPr lang="en-US" dirty="0"/>
+              <a:t>Regression, recognizes observations are not </a:t>
+            </a:r>
+            <a:r>
+              <a:rPr lang="en-US" dirty="0" smtClean="0"/>
+              <a:t>independent</a:t>
+            </a:r>
+          </a:p>
+          <a:p>
+            <a:r>
+              <a:rPr lang="en-US" dirty="0" smtClean="0"/>
+              <a:t>Procedure</a:t>
+            </a:r>
+          </a:p>
+          <a:p>
+            <a:pPr marL="800100" lvl="1" indent="-342900">
+              <a:buFont typeface="+mj-lt"/>
+              <a:buAutoNum type="arabicPeriod"/>
+            </a:pPr>
+            <a:r>
+              <a:rPr lang="en-US" dirty="0"/>
+              <a:t>Calculate correlation coefficient of original </a:t>
+            </a:r>
+            <a:r>
+              <a:rPr lang="en-US" dirty="0" smtClean="0"/>
+              <a:t>networks</a:t>
+            </a:r>
+          </a:p>
+          <a:p>
+            <a:pPr marL="800100" lvl="1" indent="-342900">
+              <a:buFont typeface="+mj-lt"/>
+              <a:buAutoNum type="arabicPeriod"/>
+            </a:pPr>
+            <a:r>
+              <a:rPr lang="en-US" dirty="0"/>
+              <a:t>Permute the nodes of 1 </a:t>
+            </a:r>
+            <a:r>
+              <a:rPr lang="en-US" dirty="0" smtClean="0"/>
+              <a:t>matrix</a:t>
+            </a:r>
+          </a:p>
+          <a:p>
+            <a:pPr marL="800100" lvl="1" indent="-342900">
+              <a:buFont typeface="+mj-lt"/>
+              <a:buAutoNum type="arabicPeriod"/>
+            </a:pPr>
+            <a:r>
+              <a:rPr lang="en-US" dirty="0"/>
+              <a:t>Compare permuted matrix to </a:t>
+            </a:r>
+            <a:r>
+              <a:rPr lang="en-US" dirty="0" smtClean="0"/>
+              <a:t>original</a:t>
+            </a:r>
+          </a:p>
+          <a:p>
+            <a:pPr marL="800100" lvl="1" indent="-342900">
+              <a:buFont typeface="+mj-lt"/>
+              <a:buAutoNum type="arabicPeriod"/>
+            </a:pPr>
+            <a:r>
+              <a:rPr lang="en-US" dirty="0"/>
+              <a:t>Do this </a:t>
+            </a:r>
+            <a:r>
+              <a:rPr lang="en-US" dirty="0" smtClean="0"/>
+              <a:t>multiple times (at least 1000)</a:t>
+            </a:r>
+          </a:p>
+          <a:p>
+            <a:pPr marL="800100" lvl="1" indent="-342900">
+              <a:buFont typeface="+mj-lt"/>
+              <a:buAutoNum type="arabicPeriod"/>
+            </a:pPr>
+            <a:r>
+              <a:rPr lang="en-US" dirty="0"/>
+              <a:t>Look at distribution of </a:t>
+            </a:r>
+            <a:r>
+              <a:rPr lang="en-US" dirty="0" smtClean="0"/>
+              <a:t>correlations</a:t>
+            </a:r>
+          </a:p>
+          <a:p>
+            <a:pPr marL="800100" lvl="1" indent="-342900">
+              <a:buFont typeface="+mj-lt"/>
+              <a:buAutoNum type="arabicPeriod"/>
+            </a:pPr>
+            <a:r>
+              <a:rPr lang="en-US" dirty="0"/>
+              <a:t>Determine the probability of a value at least as extreme as the original</a:t>
+            </a:r>
+            <a:endParaRPr lang="en-US" dirty="0"/>
+          </a:p>
+          <a:p>
+            <a:pPr lvl="1"/>
+            <a:endParaRPr lang="en-US" dirty="0"/>
+          </a:p>
+          <a:p>
+            <a:pPr lvl="1"/>
+            <a:endParaRPr lang="en-US" dirty="0"/>
           </a:p>
           <a:p>
             <a:pPr lvl="1"/>
@@ -6886,93 +7434,10 @@
 </p:sld>
 </file>
 
-<file path=ppt/slides/slide9.xml><?xml version="1.0" encoding="utf-8"?>
-<p:sld xmlns:a="http://schemas.openxmlformats.org/drawingml/2006/main" xmlns:r="http://schemas.openxmlformats.org/officeDocument/2006/relationships" xmlns:p="http://schemas.openxmlformats.org/presentationml/2006/main">
-  <p:cSld>
-    <p:spTree>
-      <p:nvGrpSpPr>
-        <p:cNvPr id="1" name=""/>
-        <p:cNvGrpSpPr/>
-        <p:nvPr/>
-      </p:nvGrpSpPr>
-      <p:grpSpPr>
-        <a:xfrm>
-          <a:off x="0" y="0"/>
-          <a:ext cx="0" cy="0"/>
-          <a:chOff x="0" y="0"/>
-          <a:chExt cx="0" cy="0"/>
-        </a:xfrm>
-      </p:grpSpPr>
-      <p:sp>
-        <p:nvSpPr>
-          <p:cNvPr id="2" name="Title 1">
-            <a:extLst>
-              <a:ext uri="{FF2B5EF4-FFF2-40B4-BE49-F238E27FC236}">
-                <a16:creationId xmlns:a16="http://schemas.microsoft.com/office/drawing/2014/main" id="{8E04BF45-2934-4514-A823-CEC1C2457E09}"/>
-              </a:ext>
-            </a:extLst>
-          </p:cNvPr>
-          <p:cNvSpPr>
-            <a:spLocks noGrp="1"/>
-          </p:cNvSpPr>
-          <p:nvPr>
-            <p:ph type="title"/>
-          </p:nvPr>
-        </p:nvSpPr>
-        <p:spPr/>
-        <p:txBody>
-          <a:bodyPr/>
-          <a:lstStyle/>
-          <a:p>
-            <a:r>
-              <a:rPr lang="en-US" dirty="0"/>
-              <a:t>Network Regression</a:t>
-            </a:r>
-          </a:p>
-        </p:txBody>
-      </p:sp>
-      <p:sp>
-        <p:nvSpPr>
-          <p:cNvPr id="3" name="Content Placeholder 2">
-            <a:extLst>
-              <a:ext uri="{FF2B5EF4-FFF2-40B4-BE49-F238E27FC236}">
-                <a16:creationId xmlns:a16="http://schemas.microsoft.com/office/drawing/2014/main" id="{391CD194-C726-4664-8AC8-2A6D3B1B55D7}"/>
-              </a:ext>
-            </a:extLst>
-          </p:cNvPr>
-          <p:cNvSpPr>
-            <a:spLocks noGrp="1"/>
-          </p:cNvSpPr>
-          <p:nvPr>
-            <p:ph idx="1"/>
-          </p:nvPr>
-        </p:nvSpPr>
-        <p:spPr/>
-        <p:txBody>
-          <a:bodyPr/>
-          <a:lstStyle/>
-          <a:p>
-            <a:endParaRPr lang="en-US"/>
-          </a:p>
-        </p:txBody>
-      </p:sp>
-    </p:spTree>
-    <p:extLst>
-      <p:ext uri="{BB962C8B-B14F-4D97-AF65-F5344CB8AC3E}">
-        <p14:creationId xmlns:p14="http://schemas.microsoft.com/office/powerpoint/2010/main" val="1848033084"/>
-      </p:ext>
-    </p:extLst>
-  </p:cSld>
-  <p:clrMapOvr>
-    <a:masterClrMapping/>
-  </p:clrMapOvr>
-</p:sld>
-</file>
-
 <file path=ppt/tags/tag1.xml><?xml version="1.0" encoding="utf-8"?>
 <p:tagLst xmlns:a="http://schemas.openxmlformats.org/drawingml/2006/main" xmlns:r="http://schemas.openxmlformats.org/officeDocument/2006/relationships" xmlns:p="http://schemas.openxmlformats.org/presentationml/2006/main">
   <p:tag name="MMPROD_NEXTUNIQUEID" val="10009"/>
-  <p:tag name="MMPROD_UIDATA" val="&lt;database version=&quot;11.0&quot;&gt;&lt;object type=&quot;1&quot; unique_id=&quot;10001&quot;&gt;&lt;object type=&quot;2&quot; unique_id=&quot;10646&quot;&gt;&lt;object type=&quot;3&quot; unique_id=&quot;10647&quot;&gt;&lt;property id=&quot;20148&quot; value=&quot;5&quot;/&gt;&lt;property id=&quot;20300&quot; value=&quot;Slide 1 - &amp;quot;Basic Network Analysis using R&amp;quot;&quot;/&gt;&lt;property id=&quot;20307&quot; value=&quot;256&quot;/&gt;&lt;/object&gt;&lt;object type=&quot;3&quot; unique_id=&quot;10648&quot;&gt;&lt;property id=&quot;20148&quot; value=&quot;5&quot;/&gt;&lt;property id=&quot;20300&quot; value=&quot;Slide 2 - &amp;quot;Introduction to Networks&amp;quot;&quot;/&gt;&lt;property id=&quot;20307&quot; value=&quot;257&quot;/&gt;&lt;/object&gt;&lt;object type=&quot;3&quot; unique_id=&quot;10649&quot;&gt;&lt;property id=&quot;20148&quot; value=&quot;5&quot;/&gt;&lt;property id=&quot;20300&quot; value=&quot;Slide 5&quot;/&gt;&lt;property id=&quot;20307&quot; value=&quot;258&quot;/&gt;&lt;/object&gt;&lt;object type=&quot;3&quot; unique_id=&quot;10650&quot;&gt;&lt;property id=&quot;20148&quot; value=&quot;5&quot;/&gt;&lt;property id=&quot;20300&quot; value=&quot;Slide 6 - &amp;quot;Note: Theory matters!&amp;quot;&quot;/&gt;&lt;property id=&quot;20307&quot; value=&quot;259&quot;/&gt;&lt;/object&gt;&lt;object type=&quot;3&quot; unique_id=&quot;10651&quot;&gt;&lt;property id=&quot;20148&quot; value=&quot;5&quot;/&gt;&lt;property id=&quot;20300&quot; value=&quot;Slide 7 - &amp;quot;Terms&amp;quot;&quot;/&gt;&lt;property id=&quot;20307&quot; value=&quot;260&quot;/&gt;&lt;/object&gt;&lt;object type=&quot;3&quot; unique_id=&quot;10652&quot;&gt;&lt;property id=&quot;20148&quot; value=&quot;5&quot;/&gt;&lt;property id=&quot;20300&quot; value=&quot;Slide 8 - &amp;quot;Terms&amp;quot;&quot;/&gt;&lt;property id=&quot;20307&quot; value=&quot;262&quot;/&gt;&lt;/object&gt;&lt;object type=&quot;3&quot; unique_id=&quot;10653&quot;&gt;&lt;property id=&quot;20148&quot; value=&quot;5&quot;/&gt;&lt;property id=&quot;20300&quot; value=&quot;Slide 10 - &amp;quot;Defining other Terms&amp;amp;#x09;&amp;quot;&quot;/&gt;&lt;property id=&quot;20307&quot; value=&quot;261&quot;/&gt;&lt;/object&gt;&lt;object type=&quot;3&quot; unique_id=&quot;10654&quot;&gt;&lt;property id=&quot;20148&quot; value=&quot;5&quot;/&gt;&lt;property id=&quot;20300&quot; value=&quot;Slide 11 - &amp;quot;Data: Adjacency Matrix vs Edge list&amp;quot;&quot;/&gt;&lt;property id=&quot;20307&quot; value=&quot;263&quot;/&gt;&lt;/object&gt;&lt;object type=&quot;3&quot; unique_id=&quot;10655&quot;&gt;&lt;property id=&quot;20148&quot; value=&quot;5&quot;/&gt;&lt;property id=&quot;20300&quot; value=&quot;Slide 12 - &amp;quot;Edgelist&amp;quot;&quot;/&gt;&lt;property id=&quot;20307&quot; value=&quot;264&quot;/&gt;&lt;/object&gt;&lt;object type=&quot;3&quot; unique_id=&quot;10711&quot;&gt;&lt;property id=&quot;20148&quot; value=&quot;5&quot;/&gt;&lt;property id=&quot;20300&quot; value=&quot;Slide 3 - &amp;quot;Who Studies Networks?&amp;quot;&quot;/&gt;&lt;property id=&quot;20307&quot; value=&quot;266&quot;/&gt;&lt;/object&gt;&lt;object type=&quot;3&quot; unique_id=&quot;10712&quot;&gt;&lt;property id=&quot;20148&quot; value=&quot;5&quot;/&gt;&lt;property id=&quot;20300&quot; value=&quot;Slide 4 - &amp;quot;Assumptions&amp;quot;&quot;/&gt;&lt;property id=&quot;20307&quot; value=&quot;265&quot;/&gt;&lt;/object&gt;&lt;object type=&quot;3&quot; unique_id=&quot;10713&quot;&gt;&lt;property id=&quot;20148&quot; value=&quot;5&quot;/&gt;&lt;property id=&quot;20300&quot; value=&quot;Slide 9 - &amp;quot;Examples of Networks?&amp;quot;&quot;/&gt;&lt;property id=&quot;20307&quot; value=&quot;267&quot;/&gt;&lt;/object&gt;&lt;/object&gt;&lt;object type=&quot;8&quot; unique_id=&quot;10666&quot;&gt;&lt;/object&gt;&lt;/object&gt;&lt;/database&gt;"/>
+  <p:tag name="MMPROD_UIDATA" val="&lt;database version=&quot;11.0&quot;&gt;&lt;object type=&quot;1&quot; unique_id=&quot;10001&quot;&gt;&lt;object type=&quot;2&quot; unique_id=&quot;10646&quot;&gt;&lt;object type=&quot;3&quot; unique_id=&quot;10647&quot;&gt;&lt;property id=&quot;20148&quot; value=&quot;5&quot;/&gt;&lt;property id=&quot;20300&quot; value=&quot;Slide 1 - &amp;quot;Advanced Network Analysis using R&amp;quot;&quot;/&gt;&lt;property id=&quot;20307&quot; value=&quot;256&quot;/&gt;&lt;/object&gt;&lt;object type=&quot;3&quot; unique_id=&quot;10648&quot;&gt;&lt;property id=&quot;20148&quot; value=&quot;5&quot;/&gt;&lt;property id=&quot;20300&quot; value=&quot;Slide 2 - &amp;quot;Introduction to Networks&amp;quot;&quot;/&gt;&lt;property id=&quot;20307&quot; value=&quot;257&quot;/&gt;&lt;/object&gt;&lt;object type=&quot;3&quot; unique_id=&quot;10650&quot;&gt;&lt;property id=&quot;20148&quot; value=&quot;5&quot;/&gt;&lt;property id=&quot;20300&quot; value=&quot;Slide 3 - &amp;quot;Note: Theory matters!&amp;quot;&quot;/&gt;&lt;property id=&quot;20307&quot; value=&quot;259&quot;/&gt;&lt;/object&gt;&lt;object type=&quot;3&quot; unique_id=&quot;10711&quot;&gt;&lt;property id=&quot;20148&quot; value=&quot;5&quot;/&gt;&lt;property id=&quot;20300&quot; value=&quot;Slide 4 - &amp;quot;Todays Workshop &amp;quot;&quot;/&gt;&lt;property id=&quot;20307&quot; value=&quot;266&quot;/&gt;&lt;/object&gt;&lt;object type=&quot;3&quot; unique_id=&quot;10713&quot;&gt;&lt;property id=&quot;20148&quot; value=&quot;5&quot;/&gt;&lt;property id=&quot;20300&quot; value=&quot;Slide 7 - &amp;quot;CUG Test&amp;quot;&quot;/&gt;&lt;property id=&quot;20307&quot; value=&quot;267&quot;/&gt;&lt;/object&gt;&lt;object type=&quot;3&quot; unique_id=&quot;10715&quot;&gt;&lt;property id=&quot;20148&quot; value=&quot;5&quot;/&gt;&lt;property id=&quot;20300&quot; value=&quot;Slide 5 - &amp;quot;Step One: Reshape Data to Proper Format&amp;amp;#x09;&amp;quot;&quot;/&gt;&lt;property id=&quot;20307&quot; value=&quot;270&quot;/&gt;&lt;/object&gt;&lt;object type=&quot;3&quot; unique_id=&quot;10716&quot;&gt;&lt;property id=&quot;20148&quot; value=&quot;5&quot;/&gt;&lt;property id=&quot;20300&quot; value=&quot;Slide 6 - &amp;quot;Step 2: Examining the Network&amp;amp;#x09;&amp;quot;&quot;/&gt;&lt;property id=&quot;20307&quot; value=&quot;271&quot;/&gt;&lt;/object&gt;&lt;object type=&quot;3&quot; unique_id=&quot;10717&quot;&gt;&lt;property id=&quot;20148&quot; value=&quot;5&quot;/&gt;&lt;property id=&quot;20300&quot; value=&quot;Slide 8 - &amp;quot;QAP and Network Regression&amp;quot;&quot;/&gt;&lt;property id=&quot;20307&quot; value=&quot;268&quot;/&gt;&lt;/object&gt;&lt;/object&gt;&lt;object type=&quot;8&quot; unique_id=&quot;10666&quot;&gt;&lt;/object&gt;&lt;/object&gt;&lt;/database&gt;"/>
   <p:tag name="SECTOMILLISECCONVERTED" val="1"/>
 </p:tagLst>
 </file>
@@ -7241,4 +7706,265 @@
     </a:ext>
   </a:extLst>
 </a:theme>
+</file>
+
+<file path=ppt/theme/theme2.xml><?xml version="1.0" encoding="utf-8"?>
+<a:theme xmlns:a="http://schemas.openxmlformats.org/drawingml/2006/main" name="Office Theme">
+  <a:themeElements>
+    <a:clrScheme name="Office">
+      <a:dk1>
+        <a:sysClr val="windowText" lastClr="000000"/>
+      </a:dk1>
+      <a:lt1>
+        <a:sysClr val="window" lastClr="FFFFFF"/>
+      </a:lt1>
+      <a:dk2>
+        <a:srgbClr val="44546A"/>
+      </a:dk2>
+      <a:lt2>
+        <a:srgbClr val="E7E6E6"/>
+      </a:lt2>
+      <a:accent1>
+        <a:srgbClr val="5B9BD5"/>
+      </a:accent1>
+      <a:accent2>
+        <a:srgbClr val="ED7D31"/>
+      </a:accent2>
+      <a:accent3>
+        <a:srgbClr val="A5A5A5"/>
+      </a:accent3>
+      <a:accent4>
+        <a:srgbClr val="FFC000"/>
+      </a:accent4>
+      <a:accent5>
+        <a:srgbClr val="4472C4"/>
+      </a:accent5>
+      <a:accent6>
+        <a:srgbClr val="70AD47"/>
+      </a:accent6>
+      <a:hlink>
+        <a:srgbClr val="0563C1"/>
+      </a:hlink>
+      <a:folHlink>
+        <a:srgbClr val="954F72"/>
+      </a:folHlink>
+    </a:clrScheme>
+    <a:fontScheme name="Office">
+      <a:majorFont>
+        <a:latin typeface="Calibri Light" panose="020F0302020204030204"/>
+        <a:ea typeface=""/>
+        <a:cs typeface=""/>
+        <a:font script="Jpan" typeface="游ゴシック Light"/>
+        <a:font script="Hang" typeface="맑은 고딕"/>
+        <a:font script="Hans" typeface="等线 Light"/>
+        <a:font script="Hant" typeface="新細明體"/>
+        <a:font script="Arab" typeface="Times New Roman"/>
+        <a:font script="Hebr" typeface="Times New Roman"/>
+        <a:font script="Thai" typeface="Angsana New"/>
+        <a:font script="Ethi" typeface="Nyala"/>
+        <a:font script="Beng" typeface="Vrinda"/>
+        <a:font script="Gujr" typeface="Shruti"/>
+        <a:font script="Khmr" typeface="MoolBoran"/>
+        <a:font script="Knda" typeface="Tunga"/>
+        <a:font script="Guru" typeface="Raavi"/>
+        <a:font script="Cans" typeface="Euphemia"/>
+        <a:font script="Cher" typeface="Plantagenet Cherokee"/>
+        <a:font script="Yiii" typeface="Microsoft Yi Baiti"/>
+        <a:font script="Tibt" typeface="Microsoft Himalaya"/>
+        <a:font script="Thaa" typeface="MV Boli"/>
+        <a:font script="Deva" typeface="Mangal"/>
+        <a:font script="Telu" typeface="Gautami"/>
+        <a:font script="Taml" typeface="Latha"/>
+        <a:font script="Syrc" typeface="Estrangelo Edessa"/>
+        <a:font script="Orya" typeface="Kalinga"/>
+        <a:font script="Mlym" typeface="Kartika"/>
+        <a:font script="Laoo" typeface="DokChampa"/>
+        <a:font script="Sinh" typeface="Iskoola Pota"/>
+        <a:font script="Mong" typeface="Mongolian Baiti"/>
+        <a:font script="Viet" typeface="Times New Roman"/>
+        <a:font script="Uigh" typeface="Microsoft Uighur"/>
+        <a:font script="Geor" typeface="Sylfaen"/>
+      </a:majorFont>
+      <a:minorFont>
+        <a:latin typeface="Calibri" panose="020F0502020204030204"/>
+        <a:ea typeface=""/>
+        <a:cs typeface=""/>
+        <a:font script="Jpan" typeface="游ゴシック"/>
+        <a:font script="Hang" typeface="맑은 고딕"/>
+        <a:font script="Hans" typeface="等线"/>
+        <a:font script="Hant" typeface="新細明體"/>
+        <a:font script="Arab" typeface="Arial"/>
+        <a:font script="Hebr" typeface="Arial"/>
+        <a:font script="Thai" typeface="Cordia New"/>
+        <a:font script="Ethi" typeface="Nyala"/>
+        <a:font script="Beng" typeface="Vrinda"/>
+        <a:font script="Gujr" typeface="Shruti"/>
+        <a:font script="Khmr" typeface="DaunPenh"/>
+        <a:font script="Knda" typeface="Tunga"/>
+        <a:font script="Guru" typeface="Raavi"/>
+        <a:font script="Cans" typeface="Euphemia"/>
+        <a:font script="Cher" typeface="Plantagenet Cherokee"/>
+        <a:font script="Yiii" typeface="Microsoft Yi Baiti"/>
+        <a:font script="Tibt" typeface="Microsoft Himalaya"/>
+        <a:font script="Thaa" typeface="MV Boli"/>
+        <a:font script="Deva" typeface="Mangal"/>
+        <a:font script="Telu" typeface="Gautami"/>
+        <a:font script="Taml" typeface="Latha"/>
+        <a:font script="Syrc" typeface="Estrangelo Edessa"/>
+        <a:font script="Orya" typeface="Kalinga"/>
+        <a:font script="Mlym" typeface="Kartika"/>
+        <a:font script="Laoo" typeface="DokChampa"/>
+        <a:font script="Sinh" typeface="Iskoola Pota"/>
+        <a:font script="Mong" typeface="Mongolian Baiti"/>
+        <a:font script="Viet" typeface="Arial"/>
+        <a:font script="Uigh" typeface="Microsoft Uighur"/>
+        <a:font script="Geor" typeface="Sylfaen"/>
+      </a:minorFont>
+    </a:fontScheme>
+    <a:fmtScheme name="Office">
+      <a:fillStyleLst>
+        <a:solidFill>
+          <a:schemeClr val="phClr"/>
+        </a:solidFill>
+        <a:gradFill rotWithShape="1">
+          <a:gsLst>
+            <a:gs pos="0">
+              <a:schemeClr val="phClr">
+                <a:lumMod val="110000"/>
+                <a:satMod val="105000"/>
+                <a:tint val="67000"/>
+              </a:schemeClr>
+            </a:gs>
+            <a:gs pos="50000">
+              <a:schemeClr val="phClr">
+                <a:lumMod val="105000"/>
+                <a:satMod val="103000"/>
+                <a:tint val="73000"/>
+              </a:schemeClr>
+            </a:gs>
+            <a:gs pos="100000">
+              <a:schemeClr val="phClr">
+                <a:lumMod val="105000"/>
+                <a:satMod val="109000"/>
+                <a:tint val="81000"/>
+              </a:schemeClr>
+            </a:gs>
+          </a:gsLst>
+          <a:lin ang="5400000" scaled="0"/>
+        </a:gradFill>
+        <a:gradFill rotWithShape="1">
+          <a:gsLst>
+            <a:gs pos="0">
+              <a:schemeClr val="phClr">
+                <a:satMod val="103000"/>
+                <a:lumMod val="102000"/>
+                <a:tint val="94000"/>
+              </a:schemeClr>
+            </a:gs>
+            <a:gs pos="50000">
+              <a:schemeClr val="phClr">
+                <a:satMod val="110000"/>
+                <a:lumMod val="100000"/>
+                <a:shade val="100000"/>
+              </a:schemeClr>
+            </a:gs>
+            <a:gs pos="100000">
+              <a:schemeClr val="phClr">
+                <a:lumMod val="99000"/>
+                <a:satMod val="120000"/>
+                <a:shade val="78000"/>
+              </a:schemeClr>
+            </a:gs>
+          </a:gsLst>
+          <a:lin ang="5400000" scaled="0"/>
+        </a:gradFill>
+      </a:fillStyleLst>
+      <a:lnStyleLst>
+        <a:ln w="6350" cap="flat" cmpd="sng" algn="ctr">
+          <a:solidFill>
+            <a:schemeClr val="phClr"/>
+          </a:solidFill>
+          <a:prstDash val="solid"/>
+          <a:miter lim="800000"/>
+        </a:ln>
+        <a:ln w="12700" cap="flat" cmpd="sng" algn="ctr">
+          <a:solidFill>
+            <a:schemeClr val="phClr"/>
+          </a:solidFill>
+          <a:prstDash val="solid"/>
+          <a:miter lim="800000"/>
+        </a:ln>
+        <a:ln w="19050" cap="flat" cmpd="sng" algn="ctr">
+          <a:solidFill>
+            <a:schemeClr val="phClr"/>
+          </a:solidFill>
+          <a:prstDash val="solid"/>
+          <a:miter lim="800000"/>
+        </a:ln>
+      </a:lnStyleLst>
+      <a:effectStyleLst>
+        <a:effectStyle>
+          <a:effectLst/>
+        </a:effectStyle>
+        <a:effectStyle>
+          <a:effectLst/>
+        </a:effectStyle>
+        <a:effectStyle>
+          <a:effectLst>
+            <a:outerShdw blurRad="57150" dist="19050" dir="5400000" algn="ctr" rotWithShape="0">
+              <a:srgbClr val="000000">
+                <a:alpha val="63000"/>
+              </a:srgbClr>
+            </a:outerShdw>
+          </a:effectLst>
+        </a:effectStyle>
+      </a:effectStyleLst>
+      <a:bgFillStyleLst>
+        <a:solidFill>
+          <a:schemeClr val="phClr"/>
+        </a:solidFill>
+        <a:solidFill>
+          <a:schemeClr val="phClr">
+            <a:tint val="95000"/>
+            <a:satMod val="170000"/>
+          </a:schemeClr>
+        </a:solidFill>
+        <a:gradFill rotWithShape="1">
+          <a:gsLst>
+            <a:gs pos="0">
+              <a:schemeClr val="phClr">
+                <a:tint val="93000"/>
+                <a:satMod val="150000"/>
+                <a:shade val="98000"/>
+                <a:lumMod val="102000"/>
+              </a:schemeClr>
+            </a:gs>
+            <a:gs pos="50000">
+              <a:schemeClr val="phClr">
+                <a:tint val="98000"/>
+                <a:satMod val="130000"/>
+                <a:shade val="90000"/>
+                <a:lumMod val="103000"/>
+              </a:schemeClr>
+            </a:gs>
+            <a:gs pos="100000">
+              <a:schemeClr val="phClr">
+                <a:shade val="63000"/>
+                <a:satMod val="120000"/>
+              </a:schemeClr>
+            </a:gs>
+          </a:gsLst>
+          <a:lin ang="5400000" scaled="0"/>
+        </a:gradFill>
+      </a:bgFillStyleLst>
+    </a:fmtScheme>
+  </a:themeElements>
+  <a:objectDefaults/>
+  <a:extraClrSchemeLst/>
+  <a:extLst>
+    <a:ext uri="{05A4C25C-085E-4340-85A3-A5531E510DB2}">
+      <thm15:themeFamily xmlns:thm15="http://schemas.microsoft.com/office/thememl/2012/main" name="Office Theme" id="{62F939B6-93AF-4DB8-9C6B-D6C7DFDC589F}" vid="{4A3C46E8-61CC-4603-A589-7422A47A8E4A}"/>
+    </a:ext>
+  </a:extLst>
+</a:theme>
 </file>
</xml_diff>